<commit_message>
changed font size in a slide
</commit_message>
<xml_diff>
--- a/Weekly Meetings FYP.pptx
+++ b/Weekly Meetings FYP.pptx
@@ -4493,7 +4493,7 @@
           <a:lstStyle/>
           <a:p>
             <a:r>
-              <a:rPr lang="en-US" sz="2400" dirty="0"/>
+              <a:rPr lang="en-US" sz="2000" dirty="0"/>
               <a:t>Parallel Manipulator</a:t>
             </a:r>
           </a:p>
@@ -5310,15 +5310,6 @@
 </file>
 
 <file path=customXml/item2.xml><?xml version="1.0" encoding="utf-8"?>
-<?mso-contentType ?>
-<FormTemplates xmlns="http://schemas.microsoft.com/sharepoint/v3/contenttype/forms">
-  <Display>DocumentLibraryForm</Display>
-  <Edit>DocumentLibraryForm</Edit>
-  <New>DocumentLibraryForm</New>
-</FormTemplates>
-</file>
-
-<file path=customXml/item3.xml><?xml version="1.0" encoding="utf-8"?>
 <ct:contentTypeSchema xmlns:ct="http://schemas.microsoft.com/office/2006/metadata/contentType" xmlns:ma="http://schemas.microsoft.com/office/2006/metadata/properties/metaAttributes" ct:_="" ma:_="" ma:contentTypeName="Document" ma:contentTypeID="0x010100193F40A6F34E71478C04A6C9266E907F" ma:contentTypeVersion="11" ma:contentTypeDescription="Create a new document." ma:contentTypeScope="" ma:versionID="cd0901fca77e6d2843dc68a8ca8736ed">
   <xsd:schema xmlns:xsd="http://www.w3.org/2001/XMLSchema" xmlns:xs="http://www.w3.org/2001/XMLSchema" xmlns:p="http://schemas.microsoft.com/office/2006/metadata/properties" xmlns:ns3="eaac0109-c76f-4150-a5b7-55c6ab159f95" xmlns:ns4="a74673e6-49b0-477e-9180-497c60e39b2b" targetNamespace="http://schemas.microsoft.com/office/2006/metadata/properties" ma:root="true" ma:fieldsID="4ab6fdd8be463f6aedc053ae46fcd042" ns3:_="" ns4:_="">
     <xsd:import namespace="eaac0109-c76f-4150-a5b7-55c6ab159f95"/>
@@ -5529,32 +5520,33 @@
 </ct:contentTypeSchema>
 </file>
 
+<file path=customXml/item3.xml><?xml version="1.0" encoding="utf-8"?>
+<?mso-contentType ?>
+<FormTemplates xmlns="http://schemas.microsoft.com/sharepoint/v3/contenttype/forms">
+  <Display>DocumentLibraryForm</Display>
+  <Edit>DocumentLibraryForm</Edit>
+  <New>DocumentLibraryForm</New>
+</FormTemplates>
+</file>
+
 <file path=customXml/itemProps1.xml><?xml version="1.0" encoding="utf-8"?>
 <ds:datastoreItem xmlns:ds="http://schemas.openxmlformats.org/officeDocument/2006/customXml" ds:itemID="{BDC207ED-65E3-42A4-9E7E-CC8552FADC59}">
   <ds:schemaRefs>
+    <ds:schemaRef ds:uri="http://schemas.openxmlformats.org/package/2006/metadata/core-properties"/>
+    <ds:schemaRef ds:uri="http://schemas.microsoft.com/office/2006/metadata/properties"/>
+    <ds:schemaRef ds:uri="http://schemas.microsoft.com/office/infopath/2007/PartnerControls"/>
+    <ds:schemaRef ds:uri="http://purl.org/dc/elements/1.1/"/>
+    <ds:schemaRef ds:uri="a74673e6-49b0-477e-9180-497c60e39b2b"/>
+    <ds:schemaRef ds:uri="http://purl.org/dc/dcmitype/"/>
+    <ds:schemaRef ds:uri="http://www.w3.org/XML/1998/namespace"/>
+    <ds:schemaRef ds:uri="http://schemas.microsoft.com/office/2006/documentManagement/types"/>
+    <ds:schemaRef ds:uri="eaac0109-c76f-4150-a5b7-55c6ab159f95"/>
     <ds:schemaRef ds:uri="http://purl.org/dc/terms/"/>
-    <ds:schemaRef ds:uri="http://schemas.microsoft.com/office/2006/documentManagement/types"/>
-    <ds:schemaRef ds:uri="http://schemas.microsoft.com/office/infopath/2007/PartnerControls"/>
-    <ds:schemaRef ds:uri="a74673e6-49b0-477e-9180-497c60e39b2b"/>
-    <ds:schemaRef ds:uri="http://schemas.openxmlformats.org/package/2006/metadata/core-properties"/>
-    <ds:schemaRef ds:uri="http://www.w3.org/XML/1998/namespace"/>
-    <ds:schemaRef ds:uri="eaac0109-c76f-4150-a5b7-55c6ab159f95"/>
-    <ds:schemaRef ds:uri="http://schemas.microsoft.com/office/2006/metadata/properties"/>
-    <ds:schemaRef ds:uri="http://purl.org/dc/dcmitype/"/>
-    <ds:schemaRef ds:uri="http://purl.org/dc/elements/1.1/"/>
   </ds:schemaRefs>
 </ds:datastoreItem>
 </file>
 
 <file path=customXml/itemProps2.xml><?xml version="1.0" encoding="utf-8"?>
-<ds:datastoreItem xmlns:ds="http://schemas.openxmlformats.org/officeDocument/2006/customXml" ds:itemID="{AFF9694F-26EC-4EBE-B928-921F0F0182AA}">
-  <ds:schemaRefs>
-    <ds:schemaRef ds:uri="http://schemas.microsoft.com/sharepoint/v3/contenttype/forms"/>
-  </ds:schemaRefs>
-</ds:datastoreItem>
-</file>
-
-<file path=customXml/itemProps3.xml><?xml version="1.0" encoding="utf-8"?>
 <ds:datastoreItem xmlns:ds="http://schemas.openxmlformats.org/officeDocument/2006/customXml" ds:itemID="{BAD43F45-E734-4B5C-A5D8-7D18AEF2115C}">
   <ds:schemaRefs>
     <ds:schemaRef ds:uri="http://schemas.microsoft.com/office/2006/metadata/contentType"/>
@@ -5571,4 +5563,12 @@
     <ds:schemaRef ds:uri="http://schemas.microsoft.com/internal/obd"/>
   </ds:schemaRefs>
 </ds:datastoreItem>
+</file>
+
+<file path=customXml/itemProps3.xml><?xml version="1.0" encoding="utf-8"?>
+<ds:datastoreItem xmlns:ds="http://schemas.openxmlformats.org/officeDocument/2006/customXml" ds:itemID="{AFF9694F-26EC-4EBE-B928-921F0F0182AA}">
+  <ds:schemaRefs>
+    <ds:schemaRef ds:uri="http://schemas.microsoft.com/sharepoint/v3/contenttype/forms"/>
+  </ds:schemaRefs>
+</ds:datastoreItem>
 </file>
</xml_diff>